<commit_message>
versão para apresentação dos documentos
</commit_message>
<xml_diff>
--- a/documentos/EXPERT SINTA PPT.pptx
+++ b/documentos/EXPERT SINTA PPT.pptx
@@ -8,9 +8,9 @@
     <p:sldId id="256" r:id="rId2"/>
     <p:sldId id="258" r:id="rId3"/>
     <p:sldId id="266" r:id="rId4"/>
-    <p:sldId id="267" r:id="rId5"/>
-    <p:sldId id="277" r:id="rId6"/>
-    <p:sldId id="275" r:id="rId7"/>
+    <p:sldId id="277" r:id="rId5"/>
+    <p:sldId id="275" r:id="rId6"/>
+    <p:sldId id="279" r:id="rId7"/>
     <p:sldId id="259" r:id="rId8"/>
     <p:sldId id="271" r:id="rId9"/>
     <p:sldId id="270" r:id="rId10"/>
@@ -19,7 +19,11 @@
     <p:sldId id="260" r:id="rId13"/>
     <p:sldId id="261" r:id="rId14"/>
     <p:sldId id="263" r:id="rId15"/>
-    <p:sldId id="273" r:id="rId16"/>
+    <p:sldId id="280" r:id="rId16"/>
+    <p:sldId id="281" r:id="rId17"/>
+    <p:sldId id="282" r:id="rId18"/>
+    <p:sldId id="283" r:id="rId19"/>
+    <p:sldId id="284" r:id="rId20"/>
   </p:sldIdLst>
   <p:sldSz cx="9144000" cy="6858000" type="screen4x3"/>
   <p:notesSz cx="6858000" cy="9144000"/>
@@ -259,7 +263,7 @@
             <a:fld id="{65B149F7-5165-4159-9FFC-213DF4FD0FA4}" type="datetimeFigureOut">
               <a:rPr lang="pt-BR" smtClean="0"/>
               <a:pPr/>
-              <a:t>06/10/2013</a:t>
+              <a:t>09/10/2013</a:t>
             </a:fld>
             <a:endParaRPr lang="pt-BR"/>
           </a:p>
@@ -1130,7 +1134,7 @@
             <a:fld id="{65B149F7-5165-4159-9FFC-213DF4FD0FA4}" type="datetimeFigureOut">
               <a:rPr lang="pt-BR" smtClean="0"/>
               <a:pPr/>
-              <a:t>06/10/2013</a:t>
+              <a:t>09/10/2013</a:t>
             </a:fld>
             <a:endParaRPr lang="pt-BR"/>
           </a:p>
@@ -1307,7 +1311,7 @@
             <a:fld id="{65B149F7-5165-4159-9FFC-213DF4FD0FA4}" type="datetimeFigureOut">
               <a:rPr lang="pt-BR" smtClean="0"/>
               <a:pPr/>
-              <a:t>06/10/2013</a:t>
+              <a:t>09/10/2013</a:t>
             </a:fld>
             <a:endParaRPr lang="pt-BR"/>
           </a:p>
@@ -1479,7 +1483,7 @@
             <a:fld id="{65B149F7-5165-4159-9FFC-213DF4FD0FA4}" type="datetimeFigureOut">
               <a:rPr lang="pt-BR" smtClean="0"/>
               <a:pPr/>
-              <a:t>06/10/2013</a:t>
+              <a:t>09/10/2013</a:t>
             </a:fld>
             <a:endParaRPr lang="pt-BR"/>
           </a:p>
@@ -1691,7 +1695,7 @@
             <a:fld id="{65B149F7-5165-4159-9FFC-213DF4FD0FA4}" type="datetimeFigureOut">
               <a:rPr lang="pt-BR" smtClean="0"/>
               <a:pPr/>
-              <a:t>06/10/2013</a:t>
+              <a:t>09/10/2013</a:t>
             </a:fld>
             <a:endParaRPr lang="pt-BR"/>
           </a:p>
@@ -2507,7 +2511,7 @@
             <a:fld id="{65B149F7-5165-4159-9FFC-213DF4FD0FA4}" type="datetimeFigureOut">
               <a:rPr lang="pt-BR" smtClean="0"/>
               <a:pPr/>
-              <a:t>06/10/2013</a:t>
+              <a:t>09/10/2013</a:t>
             </a:fld>
             <a:endParaRPr lang="pt-BR"/>
           </a:p>
@@ -2745,7 +2749,7 @@
             <a:fld id="{65B149F7-5165-4159-9FFC-213DF4FD0FA4}" type="datetimeFigureOut">
               <a:rPr lang="pt-BR" smtClean="0"/>
               <a:pPr/>
-              <a:t>06/10/2013</a:t>
+              <a:t>09/10/2013</a:t>
             </a:fld>
             <a:endParaRPr lang="pt-BR"/>
           </a:p>
@@ -3070,7 +3074,7 @@
             <a:fld id="{65B149F7-5165-4159-9FFC-213DF4FD0FA4}" type="datetimeFigureOut">
               <a:rPr lang="pt-BR" smtClean="0"/>
               <a:pPr/>
-              <a:t>06/10/2013</a:t>
+              <a:t>09/10/2013</a:t>
             </a:fld>
             <a:endParaRPr lang="pt-BR"/>
           </a:p>
@@ -3162,7 +3166,7 @@
             <a:fld id="{65B149F7-5165-4159-9FFC-213DF4FD0FA4}" type="datetimeFigureOut">
               <a:rPr lang="pt-BR" smtClean="0"/>
               <a:pPr/>
-              <a:t>06/10/2013</a:t>
+              <a:t>09/10/2013</a:t>
             </a:fld>
             <a:endParaRPr lang="pt-BR"/>
           </a:p>
@@ -3681,7 +3685,7 @@
             <a:fld id="{65B149F7-5165-4159-9FFC-213DF4FD0FA4}" type="datetimeFigureOut">
               <a:rPr lang="pt-BR" smtClean="0"/>
               <a:pPr/>
-              <a:t>06/10/2013</a:t>
+              <a:t>09/10/2013</a:t>
             </a:fld>
             <a:endParaRPr lang="pt-BR"/>
           </a:p>
@@ -4194,7 +4198,7 @@
             <a:fld id="{65B149F7-5165-4159-9FFC-213DF4FD0FA4}" type="datetimeFigureOut">
               <a:rPr lang="pt-BR" smtClean="0"/>
               <a:pPr/>
-              <a:t>06/10/2013</a:t>
+              <a:t>09/10/2013</a:t>
             </a:fld>
             <a:endParaRPr lang="pt-BR"/>
           </a:p>
@@ -4441,7 +4445,7 @@
             <a:fld id="{65B149F7-5165-4159-9FFC-213DF4FD0FA4}" type="datetimeFigureOut">
               <a:rPr lang="pt-BR" smtClean="0"/>
               <a:pPr/>
-              <a:t>06/10/2013</a:t>
+              <a:t>09/10/2013</a:t>
             </a:fld>
             <a:endParaRPr lang="pt-BR"/>
           </a:p>
@@ -5189,6 +5193,13 @@
   <p:clrMapOvr>
     <a:masterClrMapping/>
   </p:clrMapOvr>
+  <p:timing>
+    <p:tnLst>
+      <p:par>
+        <p:cTn id="1" dur="indefinite" restart="never" nodeType="tmRoot"/>
+      </p:par>
+    </p:tnLst>
+  </p:timing>
 </p:sld>
 </file>
 
@@ -5313,6 +5324,13 @@
   <p:clrMapOvr>
     <a:masterClrMapping/>
   </p:clrMapOvr>
+  <p:timing>
+    <p:tnLst>
+      <p:par>
+        <p:cTn id="1" dur="indefinite" restart="never" nodeType="tmRoot"/>
+      </p:par>
+    </p:tnLst>
+  </p:timing>
 </p:sld>
 </file>
 
@@ -5443,6 +5461,13 @@
   <p:clrMapOvr>
     <a:masterClrMapping/>
   </p:clrMapOvr>
+  <p:timing>
+    <p:tnLst>
+      <p:par>
+        <p:cTn id="1" dur="indefinite" restart="never" nodeType="tmRoot"/>
+      </p:par>
+    </p:tnLst>
+  </p:timing>
 </p:sld>
 </file>
 
@@ -5585,6 +5610,13 @@
   <p:clrMapOvr>
     <a:masterClrMapping/>
   </p:clrMapOvr>
+  <p:timing>
+    <p:tnLst>
+      <p:par>
+        <p:cTn id="1" dur="indefinite" restart="never" nodeType="tmRoot"/>
+      </p:par>
+    </p:tnLst>
+  </p:timing>
 </p:sld>
 </file>
 
@@ -5637,15 +5669,7 @@
             </a:br>
             <a:r>
               <a:rPr lang="pt-BR" sz="2400" dirty="0" smtClean="0"/>
-              <a:t> </a:t>
-            </a:r>
-            <a:r>
-              <a:rPr lang="pt-BR" sz="2400" dirty="0" smtClean="0"/>
-              <a:t>            </a:t>
-            </a:r>
-            <a:r>
-              <a:rPr lang="pt-BR" sz="2400" dirty="0" smtClean="0"/>
-              <a:t> MAPA MENTAL</a:t>
+              <a:t>              MAPA MENTAL</a:t>
             </a:r>
             <a:endParaRPr lang="pt-BR" sz="2400" dirty="0"/>
           </a:p>
@@ -5711,6 +5735,13 @@
   <p:clrMapOvr>
     <a:masterClrMapping/>
   </p:clrMapOvr>
+  <p:timing>
+    <p:tnLst>
+      <p:par>
+        <p:cTn id="1" dur="indefinite" restart="never" nodeType="tmRoot"/>
+      </p:par>
+    </p:tnLst>
+  </p:timing>
 </p:sld>
 </file>
 
@@ -5756,11 +5787,7 @@
             <a:pPr algn="ctr"/>
             <a:r>
               <a:rPr lang="pt-BR" sz="2400" dirty="0" smtClean="0"/>
-              <a:t>              MAPA </a:t>
-            </a:r>
-            <a:r>
-              <a:rPr lang="pt-BR" sz="2400" dirty="0" smtClean="0"/>
-              <a:t>MENTAL</a:t>
+              <a:t>              MAPA MENTAL</a:t>
             </a:r>
             <a:endParaRPr lang="pt-BR" sz="2400" dirty="0"/>
           </a:p>
@@ -5826,6 +5853,13 @@
   <p:clrMapOvr>
     <a:masterClrMapping/>
   </p:clrMapOvr>
+  <p:timing>
+    <p:tnLst>
+      <p:par>
+        <p:cTn id="1" dur="indefinite" restart="never" nodeType="tmRoot"/>
+      </p:par>
+    </p:tnLst>
+  </p:timing>
 </p:sld>
 </file>
 
@@ -5846,9 +5880,151 @@
           <a:chExt cx="0" cy="0"/>
         </a:xfrm>
       </p:grpSpPr>
+      <p:sp>
+        <p:nvSpPr>
+          <p:cNvPr id="2" name="Título 1"/>
+          <p:cNvSpPr>
+            <a:spLocks noGrp="1"/>
+          </p:cNvSpPr>
+          <p:nvPr>
+            <p:ph type="title"/>
+          </p:nvPr>
+        </p:nvSpPr>
+        <p:spPr/>
+        <p:txBody>
+          <a:bodyPr/>
+          <a:lstStyle/>
+          <a:p>
+            <a:pPr algn="ctr"/>
+            <a:r>
+              <a:rPr lang="pt-BR" dirty="0" smtClean="0"/>
+              <a:t>           ESDM</a:t>
+            </a:r>
+            <a:endParaRPr lang="pt-BR" dirty="0"/>
+          </a:p>
+        </p:txBody>
+      </p:sp>
+      <p:sp>
+        <p:nvSpPr>
+          <p:cNvPr id="3" name="Espaço Reservado para Conteúdo 2"/>
+          <p:cNvSpPr>
+            <a:spLocks noGrp="1"/>
+          </p:cNvSpPr>
+          <p:nvPr>
+            <p:ph sz="quarter" idx="1"/>
+          </p:nvPr>
+        </p:nvSpPr>
+        <p:spPr/>
+        <p:txBody>
+          <a:bodyPr>
+            <a:normAutofit lnSpcReduction="10000"/>
+          </a:bodyPr>
+          <a:lstStyle/>
+          <a:p>
+            <a:r>
+              <a:rPr lang="pt-BR" i="1" dirty="0" err="1" smtClean="0"/>
+              <a:t>Expert</a:t>
+            </a:r>
+            <a:r>
+              <a:rPr lang="pt-BR" i="1" dirty="0" smtClean="0"/>
+              <a:t> System </a:t>
+            </a:r>
+            <a:r>
+              <a:rPr lang="pt-BR" i="1" dirty="0" err="1" smtClean="0"/>
+              <a:t>Development</a:t>
+            </a:r>
+            <a:r>
+              <a:rPr lang="pt-BR" i="1" dirty="0" smtClean="0"/>
+              <a:t> </a:t>
+            </a:r>
+            <a:r>
+              <a:rPr lang="pt-BR" i="1" dirty="0" err="1" smtClean="0"/>
+              <a:t>Methodology</a:t>
+            </a:r>
+            <a:r>
+              <a:rPr lang="pt-BR" i="1" dirty="0" smtClean="0"/>
+              <a:t>;</a:t>
+            </a:r>
+          </a:p>
+          <a:p>
+            <a:endParaRPr lang="pt-BR" dirty="0" smtClean="0"/>
+          </a:p>
+          <a:p>
+            <a:r>
+              <a:rPr lang="pt-BR" dirty="0" smtClean="0"/>
+              <a:t>Orientada a risco;</a:t>
+            </a:r>
+          </a:p>
+          <a:p>
+            <a:endParaRPr lang="pt-BR" dirty="0" smtClean="0"/>
+          </a:p>
+          <a:p>
+            <a:r>
+              <a:rPr lang="pt-BR" dirty="0" smtClean="0"/>
+              <a:t>Criada no </a:t>
+            </a:r>
+            <a:r>
+              <a:rPr lang="pt-BR" i="1" dirty="0" smtClean="0"/>
+              <a:t>Goddard </a:t>
+            </a:r>
+            <a:r>
+              <a:rPr lang="pt-BR" i="1" dirty="0" err="1" smtClean="0"/>
+              <a:t>Space</a:t>
+            </a:r>
+            <a:r>
+              <a:rPr lang="pt-BR" i="1" dirty="0" smtClean="0"/>
+              <a:t> </a:t>
+            </a:r>
+            <a:r>
+              <a:rPr lang="pt-BR" i="1" dirty="0" err="1" smtClean="0"/>
+              <a:t>Flight</a:t>
+            </a:r>
+            <a:r>
+              <a:rPr lang="pt-BR" i="1" dirty="0" smtClean="0"/>
+              <a:t> Center</a:t>
+            </a:r>
+            <a:r>
+              <a:rPr lang="pt-BR" dirty="0" smtClean="0"/>
+              <a:t> da </a:t>
+            </a:r>
+            <a:r>
+              <a:rPr lang="pt-BR" i="1" dirty="0" smtClean="0"/>
+              <a:t>NASA; </a:t>
+            </a:r>
+          </a:p>
+          <a:p>
+            <a:endParaRPr lang="pt-BR" i="1" dirty="0" smtClean="0"/>
+          </a:p>
+          <a:p>
+            <a:r>
+              <a:rPr lang="pt-BR" i="1" dirty="0" smtClean="0"/>
+              <a:t>Criação de protótipos iterativamente;</a:t>
+            </a:r>
+          </a:p>
+          <a:p>
+            <a:endParaRPr lang="pt-BR" i="1" dirty="0" smtClean="0"/>
+          </a:p>
+          <a:p>
+            <a:r>
+              <a:rPr lang="pt-BR" dirty="0" smtClean="0"/>
+              <a:t>Transição para uma metodologia tradicional;</a:t>
+            </a:r>
+          </a:p>
+          <a:p>
+            <a:endParaRPr lang="pt-BR" dirty="0" smtClean="0"/>
+          </a:p>
+          <a:p>
+            <a:r>
+              <a:rPr lang="pt-BR" dirty="0" smtClean="0"/>
+              <a:t>Foco na aquisição de conhecimento.</a:t>
+            </a:r>
+            <a:endParaRPr lang="pt-BR" dirty="0"/>
+          </a:p>
+        </p:txBody>
+      </p:sp>
       <p:pic>
         <p:nvPicPr>
-          <p:cNvPr id="26626" name="Picture 2" descr="http://farm7.staticflickr.com/6141/5948838730_2f6e3b8632_z.jpg"/>
+          <p:cNvPr id="4" name="Imagem 1" descr="C:\Users\Felipe S. Macedo\Downloads\logo_unb_gama.jpg"/>
           <p:cNvPicPr>
             <a:picLocks noChangeAspect="1" noChangeArrowheads="1"/>
           </p:cNvPicPr>
@@ -5863,32 +6039,6 @@
         </p:blipFill>
         <p:spPr bwMode="auto">
           <a:xfrm>
-            <a:off x="2500298" y="1285860"/>
-            <a:ext cx="4267200" cy="5572140"/>
-          </a:xfrm>
-          <a:prstGeom prst="rect">
-            <a:avLst/>
-          </a:prstGeom>
-          <a:noFill/>
-        </p:spPr>
-      </p:pic>
-      <p:pic>
-        <p:nvPicPr>
-          <p:cNvPr id="3" name="Imagem 1" descr="C:\Users\Felipe S. Macedo\Downloads\logo_unb_gama.jpg"/>
-          <p:cNvPicPr>
-            <a:picLocks noChangeAspect="1" noChangeArrowheads="1"/>
-          </p:cNvPicPr>
-          <p:nvPr/>
-        </p:nvPicPr>
-        <p:blipFill>
-          <a:blip r:embed="rId3"/>
-          <a:srcRect/>
-          <a:stretch>
-            <a:fillRect/>
-          </a:stretch>
-        </p:blipFill>
-        <p:spPr bwMode="auto">
-          <a:xfrm>
             <a:off x="3500430" y="285728"/>
             <a:ext cx="2384425" cy="555625"/>
           </a:xfrm>
@@ -5909,6 +6059,771 @@
   <p:clrMapOvr>
     <a:masterClrMapping/>
   </p:clrMapOvr>
+  <p:timing>
+    <p:tnLst>
+      <p:par>
+        <p:cTn id="1" dur="indefinite" restart="never" nodeType="tmRoot"/>
+      </p:par>
+    </p:tnLst>
+  </p:timing>
+</p:sld>
+</file>
+
+<file path=ppt/slides/slide16.xml><?xml version="1.0" encoding="utf-8"?>
+<p:sld xmlns:a="http://schemas.openxmlformats.org/drawingml/2006/main" xmlns:r="http://schemas.openxmlformats.org/officeDocument/2006/relationships" xmlns:p="http://schemas.openxmlformats.org/presentationml/2006/main">
+  <p:cSld>
+    <p:spTree>
+      <p:nvGrpSpPr>
+        <p:cNvPr id="1" name=""/>
+        <p:cNvGrpSpPr/>
+        <p:nvPr/>
+      </p:nvGrpSpPr>
+      <p:grpSpPr>
+        <a:xfrm>
+          <a:off x="0" y="0"/>
+          <a:ext cx="0" cy="0"/>
+          <a:chOff x="0" y="0"/>
+          <a:chExt cx="0" cy="0"/>
+        </a:xfrm>
+      </p:grpSpPr>
+      <p:sp>
+        <p:nvSpPr>
+          <p:cNvPr id="2" name="Título 1"/>
+          <p:cNvSpPr>
+            <a:spLocks noGrp="1"/>
+          </p:cNvSpPr>
+          <p:nvPr>
+            <p:ph type="title"/>
+          </p:nvPr>
+        </p:nvSpPr>
+        <p:spPr>
+          <a:xfrm>
+            <a:off x="457200" y="274638"/>
+            <a:ext cx="7467600" cy="654032"/>
+          </a:xfrm>
+        </p:spPr>
+        <p:txBody>
+          <a:bodyPr/>
+          <a:lstStyle/>
+          <a:p>
+            <a:pPr algn="ctr"/>
+            <a:r>
+              <a:rPr lang="pt-BR" dirty="0" smtClean="0"/>
+              <a:t>ESDM Ciclo de Vida</a:t>
+            </a:r>
+            <a:endParaRPr lang="pt-BR" dirty="0"/>
+          </a:p>
+        </p:txBody>
+      </p:sp>
+      <p:sp>
+        <p:nvSpPr>
+          <p:cNvPr id="3" name="Espaço Reservado para Conteúdo 2"/>
+          <p:cNvSpPr>
+            <a:spLocks noGrp="1"/>
+          </p:cNvSpPr>
+          <p:nvPr>
+            <p:ph sz="quarter" idx="1"/>
+          </p:nvPr>
+        </p:nvSpPr>
+        <p:spPr/>
+        <p:txBody>
+          <a:bodyPr>
+            <a:normAutofit fontScale="92500" lnSpcReduction="10000"/>
+          </a:bodyPr>
+          <a:lstStyle/>
+          <a:p>
+            <a:endParaRPr lang="pt-BR" dirty="0" smtClean="0"/>
+          </a:p>
+          <a:p>
+            <a:endParaRPr lang="pt-BR" dirty="0" smtClean="0"/>
+          </a:p>
+          <a:p>
+            <a:endParaRPr lang="pt-BR" dirty="0" smtClean="0"/>
+          </a:p>
+          <a:p>
+            <a:endParaRPr lang="pt-BR" dirty="0" smtClean="0"/>
+          </a:p>
+          <a:p>
+            <a:endParaRPr lang="pt-BR" dirty="0" smtClean="0"/>
+          </a:p>
+          <a:p>
+            <a:endParaRPr lang="pt-BR" dirty="0" smtClean="0"/>
+          </a:p>
+          <a:p>
+            <a:endParaRPr lang="pt-BR" dirty="0" smtClean="0"/>
+          </a:p>
+          <a:p>
+            <a:endParaRPr lang="pt-BR" dirty="0" smtClean="0"/>
+          </a:p>
+          <a:p>
+            <a:endParaRPr lang="pt-BR" dirty="0" smtClean="0"/>
+          </a:p>
+          <a:p>
+            <a:endParaRPr lang="pt-BR" dirty="0" smtClean="0"/>
+          </a:p>
+          <a:p>
+            <a:endParaRPr lang="pt-BR" dirty="0" smtClean="0"/>
+          </a:p>
+          <a:p>
+            <a:pPr hangingPunct="0"/>
+            <a:r>
+              <a:rPr lang="pt-BR" sz="1300" dirty="0" smtClean="0"/>
+              <a:t>Fonte: Fonte: (GILSTRAP, 1990)</a:t>
+            </a:r>
+          </a:p>
+          <a:p>
+            <a:pPr hangingPunct="0">
+              <a:buNone/>
+            </a:pPr>
+            <a:r>
+              <a:rPr lang="pt-BR" sz="1300" dirty="0" smtClean="0"/>
+              <a:t> </a:t>
+            </a:r>
+            <a:endParaRPr lang="pt-BR" sz="1300" dirty="0"/>
+          </a:p>
+        </p:txBody>
+      </p:sp>
+      <p:pic>
+        <p:nvPicPr>
+          <p:cNvPr id="1026" name="Picture 2"/>
+          <p:cNvPicPr>
+            <a:picLocks noChangeAspect="1" noChangeArrowheads="1"/>
+          </p:cNvPicPr>
+          <p:nvPr/>
+        </p:nvPicPr>
+        <p:blipFill>
+          <a:blip r:embed="rId2"/>
+          <a:srcRect/>
+          <a:stretch>
+            <a:fillRect/>
+          </a:stretch>
+        </p:blipFill>
+        <p:spPr bwMode="auto">
+          <a:xfrm>
+            <a:off x="927100" y="928671"/>
+            <a:ext cx="7216800" cy="4786346"/>
+          </a:xfrm>
+          <a:prstGeom prst="rect">
+            <a:avLst/>
+          </a:prstGeom>
+          <a:solidFill>
+            <a:srgbClr val="FFFFFF"/>
+          </a:solidFill>
+          <a:ln w="9525">
+            <a:noFill/>
+            <a:miter lim="800000"/>
+            <a:headEnd/>
+            <a:tailEnd/>
+          </a:ln>
+        </p:spPr>
+      </p:pic>
+    </p:spTree>
+  </p:cSld>
+  <p:clrMapOvr>
+    <a:masterClrMapping/>
+  </p:clrMapOvr>
+  <p:timing>
+    <p:tnLst>
+      <p:par>
+        <p:cTn id="1" dur="indefinite" restart="never" nodeType="tmRoot"/>
+      </p:par>
+    </p:tnLst>
+  </p:timing>
+</p:sld>
+</file>
+
+<file path=ppt/slides/slide17.xml><?xml version="1.0" encoding="utf-8"?>
+<p:sld xmlns:a="http://schemas.openxmlformats.org/drawingml/2006/main" xmlns:r="http://schemas.openxmlformats.org/officeDocument/2006/relationships" xmlns:p="http://schemas.openxmlformats.org/presentationml/2006/main">
+  <p:cSld>
+    <p:spTree>
+      <p:nvGrpSpPr>
+        <p:cNvPr id="1" name=""/>
+        <p:cNvGrpSpPr/>
+        <p:nvPr/>
+      </p:nvGrpSpPr>
+      <p:grpSpPr>
+        <a:xfrm>
+          <a:off x="0" y="0"/>
+          <a:ext cx="0" cy="0"/>
+          <a:chOff x="0" y="0"/>
+          <a:chExt cx="0" cy="0"/>
+        </a:xfrm>
+      </p:grpSpPr>
+      <p:sp>
+        <p:nvSpPr>
+          <p:cNvPr id="2" name="Título 1"/>
+          <p:cNvSpPr>
+            <a:spLocks noGrp="1"/>
+          </p:cNvSpPr>
+          <p:nvPr>
+            <p:ph type="title"/>
+          </p:nvPr>
+        </p:nvSpPr>
+        <p:spPr/>
+        <p:txBody>
+          <a:bodyPr/>
+          <a:lstStyle/>
+          <a:p>
+            <a:pPr algn="ctr"/>
+            <a:r>
+              <a:rPr lang="pt-BR" dirty="0" smtClean="0"/>
+              <a:t>             ESDM Estágios</a:t>
+            </a:r>
+            <a:endParaRPr lang="pt-BR" dirty="0"/>
+          </a:p>
+        </p:txBody>
+      </p:sp>
+      <p:sp>
+        <p:nvSpPr>
+          <p:cNvPr id="3" name="Espaço Reservado para Conteúdo 2"/>
+          <p:cNvSpPr>
+            <a:spLocks noGrp="1"/>
+          </p:cNvSpPr>
+          <p:nvPr>
+            <p:ph sz="quarter" idx="1"/>
+          </p:nvPr>
+        </p:nvSpPr>
+        <p:spPr/>
+        <p:txBody>
+          <a:bodyPr/>
+          <a:lstStyle/>
+          <a:p>
+            <a:r>
+              <a:rPr lang="pt-BR" i="1" dirty="0" err="1" smtClean="0"/>
+              <a:t>Feasibility</a:t>
+            </a:r>
+            <a:r>
+              <a:rPr lang="pt-BR" i="1" dirty="0" smtClean="0"/>
+              <a:t> </a:t>
+            </a:r>
+            <a:r>
+              <a:rPr lang="pt-BR" i="1" dirty="0" err="1" smtClean="0"/>
+              <a:t>Demonstration</a:t>
+            </a:r>
+            <a:r>
+              <a:rPr lang="pt-BR" i="1" dirty="0" smtClean="0"/>
+              <a:t> </a:t>
+            </a:r>
+            <a:r>
+              <a:rPr lang="pt-BR" i="1" dirty="0" err="1" smtClean="0"/>
+              <a:t>Prototype</a:t>
+            </a:r>
+            <a:r>
+              <a:rPr lang="pt-BR" dirty="0" smtClean="0"/>
+              <a:t> (Protótipo de </a:t>
+            </a:r>
+            <a:r>
+              <a:rPr lang="pt-BR" dirty="0" err="1" smtClean="0"/>
+              <a:t>demosntração</a:t>
+            </a:r>
+            <a:r>
+              <a:rPr lang="pt-BR" dirty="0" smtClean="0"/>
+              <a:t> de viabilidade);</a:t>
+            </a:r>
+          </a:p>
+          <a:p>
+            <a:endParaRPr lang="pt-BR" dirty="0" smtClean="0"/>
+          </a:p>
+          <a:p>
+            <a:r>
+              <a:rPr lang="pt-BR" i="1" dirty="0" err="1" smtClean="0"/>
+              <a:t>Research</a:t>
+            </a:r>
+            <a:r>
+              <a:rPr lang="pt-BR" i="1" dirty="0" smtClean="0"/>
+              <a:t> </a:t>
+            </a:r>
+            <a:r>
+              <a:rPr lang="pt-BR" i="1" dirty="0" err="1" smtClean="0"/>
+              <a:t>Prototype</a:t>
+            </a:r>
+            <a:r>
+              <a:rPr lang="pt-BR" dirty="0" smtClean="0"/>
+              <a:t> (Protótipo de Pesquisa);</a:t>
+            </a:r>
+          </a:p>
+          <a:p>
+            <a:endParaRPr lang="pt-BR" dirty="0" smtClean="0"/>
+          </a:p>
+          <a:p>
+            <a:r>
+              <a:rPr lang="pt-BR" i="1" dirty="0" smtClean="0"/>
+              <a:t>Field </a:t>
+            </a:r>
+            <a:r>
+              <a:rPr lang="pt-BR" i="1" dirty="0" err="1" smtClean="0"/>
+              <a:t>Prototype</a:t>
+            </a:r>
+            <a:r>
+              <a:rPr lang="pt-BR" dirty="0" smtClean="0"/>
+              <a:t> (Protótipo de Campo);</a:t>
+            </a:r>
+          </a:p>
+          <a:p>
+            <a:endParaRPr lang="pt-BR" dirty="0" smtClean="0"/>
+          </a:p>
+          <a:p>
+            <a:r>
+              <a:rPr lang="pt-BR" i="1" dirty="0" err="1" smtClean="0"/>
+              <a:t>Production</a:t>
+            </a:r>
+            <a:r>
+              <a:rPr lang="pt-BR" i="1" dirty="0" smtClean="0"/>
+              <a:t> </a:t>
+            </a:r>
+            <a:r>
+              <a:rPr lang="pt-BR" i="1" dirty="0" err="1" smtClean="0"/>
+              <a:t>Prototype</a:t>
+            </a:r>
+            <a:r>
+              <a:rPr lang="pt-BR" dirty="0" smtClean="0"/>
+              <a:t> (Protótipo de Produção);</a:t>
+            </a:r>
+          </a:p>
+          <a:p>
+            <a:endParaRPr lang="pt-BR" dirty="0" smtClean="0"/>
+          </a:p>
+          <a:p>
+            <a:r>
+              <a:rPr lang="pt-BR" i="1" dirty="0" err="1" smtClean="0"/>
+              <a:t>Operation</a:t>
+            </a:r>
+            <a:r>
+              <a:rPr lang="pt-BR" i="1" dirty="0" smtClean="0"/>
+              <a:t> </a:t>
+            </a:r>
+            <a:r>
+              <a:rPr lang="pt-BR" i="1" dirty="0" err="1" smtClean="0"/>
+              <a:t>Prototype</a:t>
+            </a:r>
+            <a:r>
+              <a:rPr lang="pt-BR" dirty="0" smtClean="0"/>
+              <a:t> (Protótipo Operacional).</a:t>
+            </a:r>
+            <a:endParaRPr lang="pt-BR" dirty="0"/>
+          </a:p>
+        </p:txBody>
+      </p:sp>
+      <p:pic>
+        <p:nvPicPr>
+          <p:cNvPr id="4" name="Imagem 1" descr="C:\Users\Felipe S. Macedo\Downloads\logo_unb_gama.jpg"/>
+          <p:cNvPicPr>
+            <a:picLocks noChangeAspect="1" noChangeArrowheads="1"/>
+          </p:cNvPicPr>
+          <p:nvPr/>
+        </p:nvPicPr>
+        <p:blipFill>
+          <a:blip r:embed="rId2"/>
+          <a:srcRect/>
+          <a:stretch>
+            <a:fillRect/>
+          </a:stretch>
+        </p:blipFill>
+        <p:spPr bwMode="auto">
+          <a:xfrm>
+            <a:off x="3500430" y="285728"/>
+            <a:ext cx="2384425" cy="555625"/>
+          </a:xfrm>
+          <a:prstGeom prst="rect">
+            <a:avLst/>
+          </a:prstGeom>
+          <a:noFill/>
+          <a:ln w="9525">
+            <a:noFill/>
+            <a:miter lim="800000"/>
+            <a:headEnd/>
+            <a:tailEnd/>
+          </a:ln>
+        </p:spPr>
+      </p:pic>
+    </p:spTree>
+  </p:cSld>
+  <p:clrMapOvr>
+    <a:masterClrMapping/>
+  </p:clrMapOvr>
+  <p:timing>
+    <p:tnLst>
+      <p:par>
+        <p:cTn id="1" dur="indefinite" restart="never" nodeType="tmRoot"/>
+      </p:par>
+    </p:tnLst>
+  </p:timing>
+</p:sld>
+</file>
+
+<file path=ppt/slides/slide18.xml><?xml version="1.0" encoding="utf-8"?>
+<p:sld xmlns:a="http://schemas.openxmlformats.org/drawingml/2006/main" xmlns:r="http://schemas.openxmlformats.org/officeDocument/2006/relationships" xmlns:p="http://schemas.openxmlformats.org/presentationml/2006/main">
+  <p:cSld>
+    <p:spTree>
+      <p:nvGrpSpPr>
+        <p:cNvPr id="1" name=""/>
+        <p:cNvGrpSpPr/>
+        <p:nvPr/>
+      </p:nvGrpSpPr>
+      <p:grpSpPr>
+        <a:xfrm>
+          <a:off x="0" y="0"/>
+          <a:ext cx="0" cy="0"/>
+          <a:chOff x="0" y="0"/>
+          <a:chExt cx="0" cy="0"/>
+        </a:xfrm>
+      </p:grpSpPr>
+      <p:sp>
+        <p:nvSpPr>
+          <p:cNvPr id="2" name="Título 1"/>
+          <p:cNvSpPr>
+            <a:spLocks noGrp="1"/>
+          </p:cNvSpPr>
+          <p:nvPr>
+            <p:ph type="title"/>
+          </p:nvPr>
+        </p:nvSpPr>
+        <p:spPr/>
+        <p:txBody>
+          <a:bodyPr/>
+          <a:lstStyle/>
+          <a:p>
+            <a:pPr algn="ctr"/>
+            <a:r>
+              <a:rPr lang="pt-BR" dirty="0" smtClean="0"/>
+              <a:t>ESDM Passos</a:t>
+            </a:r>
+            <a:endParaRPr lang="pt-BR" dirty="0"/>
+          </a:p>
+        </p:txBody>
+      </p:sp>
+      <p:sp>
+        <p:nvSpPr>
+          <p:cNvPr id="3" name="Espaço Reservado para Conteúdo 2"/>
+          <p:cNvSpPr>
+            <a:spLocks noGrp="1"/>
+          </p:cNvSpPr>
+          <p:nvPr>
+            <p:ph sz="quarter" idx="1"/>
+          </p:nvPr>
+        </p:nvSpPr>
+        <p:spPr/>
+        <p:txBody>
+          <a:bodyPr/>
+          <a:lstStyle/>
+          <a:p>
+            <a:r>
+              <a:rPr lang="pt-BR" i="1" dirty="0" err="1" smtClean="0"/>
+              <a:t>Identify</a:t>
+            </a:r>
+            <a:r>
+              <a:rPr lang="pt-BR" i="1" dirty="0" smtClean="0"/>
+              <a:t> </a:t>
+            </a:r>
+            <a:r>
+              <a:rPr lang="pt-BR" i="1" dirty="0" err="1" smtClean="0"/>
+              <a:t>the</a:t>
+            </a:r>
+            <a:r>
+              <a:rPr lang="pt-BR" i="1" dirty="0" smtClean="0"/>
+              <a:t> </a:t>
+            </a:r>
+            <a:r>
+              <a:rPr lang="pt-BR" i="1" dirty="0" err="1" smtClean="0"/>
+              <a:t>problem</a:t>
+            </a:r>
+            <a:r>
+              <a:rPr lang="pt-BR" dirty="0" smtClean="0"/>
+              <a:t> (Identificar o problema);</a:t>
+            </a:r>
+          </a:p>
+          <a:p>
+            <a:endParaRPr lang="pt-BR" dirty="0" smtClean="0"/>
+          </a:p>
+          <a:p>
+            <a:r>
+              <a:rPr lang="pt-BR" i="1" dirty="0" err="1" smtClean="0"/>
+              <a:t>Conceptualize</a:t>
+            </a:r>
+            <a:r>
+              <a:rPr lang="pt-BR" i="1" dirty="0" smtClean="0"/>
+              <a:t> </a:t>
+            </a:r>
+            <a:r>
+              <a:rPr lang="pt-BR" i="1" dirty="0" err="1" smtClean="0"/>
+              <a:t>the</a:t>
+            </a:r>
+            <a:r>
+              <a:rPr lang="pt-BR" i="1" dirty="0" smtClean="0"/>
+              <a:t> Solution</a:t>
+            </a:r>
+            <a:r>
+              <a:rPr lang="pt-BR" dirty="0" smtClean="0"/>
+              <a:t> (</a:t>
+            </a:r>
+            <a:r>
+              <a:rPr lang="pt-BR" dirty="0" err="1" smtClean="0"/>
+              <a:t>Conceitualizar</a:t>
+            </a:r>
+            <a:r>
+              <a:rPr lang="pt-BR" dirty="0" smtClean="0"/>
+              <a:t> a solução);</a:t>
+            </a:r>
+          </a:p>
+          <a:p>
+            <a:endParaRPr lang="pt-BR" dirty="0" smtClean="0"/>
+          </a:p>
+          <a:p>
+            <a:r>
+              <a:rPr lang="pt-BR" i="1" dirty="0" smtClean="0"/>
+              <a:t>Formalize </a:t>
+            </a:r>
+            <a:r>
+              <a:rPr lang="pt-BR" i="1" dirty="0" err="1" smtClean="0"/>
+              <a:t>the</a:t>
+            </a:r>
+            <a:r>
+              <a:rPr lang="pt-BR" i="1" dirty="0" smtClean="0"/>
+              <a:t> Solution</a:t>
+            </a:r>
+            <a:r>
+              <a:rPr lang="pt-BR" dirty="0" smtClean="0"/>
+              <a:t> (Formalizar a Solução);</a:t>
+            </a:r>
+          </a:p>
+          <a:p>
+            <a:endParaRPr lang="pt-BR" dirty="0" smtClean="0"/>
+          </a:p>
+          <a:p>
+            <a:r>
+              <a:rPr lang="pt-BR" i="1" dirty="0" err="1" smtClean="0"/>
+              <a:t>Implement</a:t>
+            </a:r>
+            <a:r>
+              <a:rPr lang="pt-BR" i="1" dirty="0" smtClean="0"/>
+              <a:t> </a:t>
+            </a:r>
+            <a:r>
+              <a:rPr lang="pt-BR" i="1" dirty="0" err="1" smtClean="0"/>
+              <a:t>the</a:t>
+            </a:r>
+            <a:r>
+              <a:rPr lang="pt-BR" i="1" dirty="0" smtClean="0"/>
+              <a:t> </a:t>
+            </a:r>
+            <a:r>
+              <a:rPr lang="pt-BR" i="1" dirty="0" err="1" smtClean="0"/>
+              <a:t>Prototype</a:t>
+            </a:r>
+            <a:r>
+              <a:rPr lang="pt-BR" dirty="0" smtClean="0"/>
+              <a:t> (Implementar o protótipo);</a:t>
+            </a:r>
+          </a:p>
+          <a:p>
+            <a:endParaRPr lang="pt-BR" dirty="0" smtClean="0"/>
+          </a:p>
+          <a:p>
+            <a:r>
+              <a:rPr lang="pt-BR" i="1" dirty="0" err="1" smtClean="0"/>
+              <a:t>Test</a:t>
+            </a:r>
+            <a:r>
+              <a:rPr lang="pt-BR" i="1" dirty="0" smtClean="0"/>
+              <a:t> </a:t>
+            </a:r>
+            <a:r>
+              <a:rPr lang="pt-BR" i="1" dirty="0" err="1" smtClean="0"/>
+              <a:t>the</a:t>
+            </a:r>
+            <a:r>
+              <a:rPr lang="pt-BR" i="1" dirty="0" smtClean="0"/>
+              <a:t> </a:t>
+            </a:r>
+            <a:r>
+              <a:rPr lang="pt-BR" i="1" dirty="0" err="1" smtClean="0"/>
+              <a:t>Prototype</a:t>
+            </a:r>
+            <a:r>
+              <a:rPr lang="pt-BR" dirty="0" smtClean="0"/>
+              <a:t> (Testar o Protótipo).</a:t>
+            </a:r>
+            <a:endParaRPr lang="pt-BR" dirty="0"/>
+          </a:p>
+        </p:txBody>
+      </p:sp>
+      <p:pic>
+        <p:nvPicPr>
+          <p:cNvPr id="4" name="Imagem 1" descr="C:\Users\Felipe S. Macedo\Downloads\logo_unb_gama.jpg"/>
+          <p:cNvPicPr>
+            <a:picLocks noChangeAspect="1" noChangeArrowheads="1"/>
+          </p:cNvPicPr>
+          <p:nvPr/>
+        </p:nvPicPr>
+        <p:blipFill>
+          <a:blip r:embed="rId2"/>
+          <a:srcRect/>
+          <a:stretch>
+            <a:fillRect/>
+          </a:stretch>
+        </p:blipFill>
+        <p:spPr bwMode="auto">
+          <a:xfrm>
+            <a:off x="3500430" y="285728"/>
+            <a:ext cx="2384425" cy="555625"/>
+          </a:xfrm>
+          <a:prstGeom prst="rect">
+            <a:avLst/>
+          </a:prstGeom>
+          <a:noFill/>
+          <a:ln w="9525">
+            <a:noFill/>
+            <a:miter lim="800000"/>
+            <a:headEnd/>
+            <a:tailEnd/>
+          </a:ln>
+        </p:spPr>
+      </p:pic>
+    </p:spTree>
+  </p:cSld>
+  <p:clrMapOvr>
+    <a:masterClrMapping/>
+  </p:clrMapOvr>
+  <p:timing>
+    <p:tnLst>
+      <p:par>
+        <p:cTn id="1" dur="indefinite" restart="never" nodeType="tmRoot"/>
+      </p:par>
+    </p:tnLst>
+  </p:timing>
+</p:sld>
+</file>
+
+<file path=ppt/slides/slide19.xml><?xml version="1.0" encoding="utf-8"?>
+<p:sld xmlns:a="http://schemas.openxmlformats.org/drawingml/2006/main" xmlns:r="http://schemas.openxmlformats.org/officeDocument/2006/relationships" xmlns:p="http://schemas.openxmlformats.org/presentationml/2006/main">
+  <p:cSld>
+    <p:spTree>
+      <p:nvGrpSpPr>
+        <p:cNvPr id="1" name=""/>
+        <p:cNvGrpSpPr/>
+        <p:nvPr/>
+      </p:nvGrpSpPr>
+      <p:grpSpPr>
+        <a:xfrm>
+          <a:off x="0" y="0"/>
+          <a:ext cx="0" cy="0"/>
+          <a:chOff x="0" y="0"/>
+          <a:chExt cx="0" cy="0"/>
+        </a:xfrm>
+      </p:grpSpPr>
+      <p:sp>
+        <p:nvSpPr>
+          <p:cNvPr id="2" name="Título 1"/>
+          <p:cNvSpPr>
+            <a:spLocks noGrp="1"/>
+          </p:cNvSpPr>
+          <p:nvPr>
+            <p:ph type="title"/>
+          </p:nvPr>
+        </p:nvSpPr>
+        <p:spPr/>
+        <p:txBody>
+          <a:bodyPr/>
+          <a:lstStyle/>
+          <a:p>
+            <a:endParaRPr lang="pt-BR"/>
+          </a:p>
+        </p:txBody>
+      </p:sp>
+      <p:sp>
+        <p:nvSpPr>
+          <p:cNvPr id="3" name="Espaço Reservado para Conteúdo 2"/>
+          <p:cNvSpPr>
+            <a:spLocks noGrp="1"/>
+          </p:cNvSpPr>
+          <p:nvPr>
+            <p:ph sz="quarter" idx="1"/>
+          </p:nvPr>
+        </p:nvSpPr>
+        <p:spPr/>
+        <p:txBody>
+          <a:bodyPr>
+            <a:normAutofit/>
+          </a:bodyPr>
+          <a:lstStyle/>
+          <a:p>
+            <a:endParaRPr lang="pt-BR" dirty="0" smtClean="0"/>
+          </a:p>
+          <a:p>
+            <a:endParaRPr lang="pt-BR" dirty="0" smtClean="0"/>
+          </a:p>
+          <a:p>
+            <a:endParaRPr lang="pt-BR" dirty="0" smtClean="0"/>
+          </a:p>
+          <a:p>
+            <a:endParaRPr lang="pt-BR" dirty="0" smtClean="0"/>
+          </a:p>
+          <a:p>
+            <a:endParaRPr lang="pt-BR" dirty="0" smtClean="0"/>
+          </a:p>
+          <a:p>
+            <a:endParaRPr lang="pt-BR" dirty="0" smtClean="0"/>
+          </a:p>
+          <a:p>
+            <a:endParaRPr lang="pt-BR" dirty="0" smtClean="0"/>
+          </a:p>
+          <a:p>
+            <a:endParaRPr lang="pt-BR" dirty="0" smtClean="0"/>
+          </a:p>
+          <a:p>
+            <a:endParaRPr lang="pt-BR" dirty="0" smtClean="0"/>
+          </a:p>
+          <a:p>
+            <a:endParaRPr lang="pt-BR" dirty="0" smtClean="0"/>
+          </a:p>
+          <a:p>
+            <a:pPr algn="r"/>
+            <a:r>
+              <a:rPr lang="pt-BR" sz="1200" dirty="0" smtClean="0"/>
+              <a:t>Fonte: Flickr.com</a:t>
+            </a:r>
+            <a:endParaRPr lang="pt-BR" sz="1200" dirty="0"/>
+          </a:p>
+        </p:txBody>
+      </p:sp>
+      <p:pic>
+        <p:nvPicPr>
+          <p:cNvPr id="7" name="Picture 2" descr="http://farm7.staticflickr.com/6141/5948838730_2f6e3b8632_z.jpg"/>
+          <p:cNvPicPr>
+            <a:picLocks noChangeAspect="1" noChangeArrowheads="1"/>
+          </p:cNvPicPr>
+          <p:nvPr/>
+        </p:nvPicPr>
+        <p:blipFill>
+          <a:blip r:embed="rId2"/>
+          <a:srcRect/>
+          <a:stretch>
+            <a:fillRect/>
+          </a:stretch>
+        </p:blipFill>
+        <p:spPr bwMode="auto">
+          <a:xfrm>
+            <a:off x="2143108" y="0"/>
+            <a:ext cx="4857784" cy="6072206"/>
+          </a:xfrm>
+          <a:prstGeom prst="rect">
+            <a:avLst/>
+          </a:prstGeom>
+          <a:noFill/>
+        </p:spPr>
+      </p:pic>
+    </p:spTree>
+  </p:cSld>
+  <p:clrMapOvr>
+    <a:masterClrMapping/>
+  </p:clrMapOvr>
+  <p:timing>
+    <p:tnLst>
+      <p:par>
+        <p:cTn id="1" dur="indefinite" restart="never" nodeType="tmRoot"/>
+      </p:par>
+    </p:tnLst>
+  </p:timing>
 </p:sld>
 </file>
 
@@ -5955,7 +6870,7 @@
             </a:br>
             <a:r>
               <a:rPr lang="pt-BR" dirty="0" smtClean="0"/>
-              <a:t>O que é o Shell </a:t>
+              <a:t>O que é o </a:t>
             </a:r>
             <a:r>
               <a:rPr lang="pt-BR" dirty="0" err="1" smtClean="0"/>
@@ -5997,13 +6912,17 @@
           <a:p>
             <a:r>
               <a:rPr lang="pt-BR" dirty="0" smtClean="0"/>
-              <a:t> </a:t>
-            </a:r>
+              <a:t> Inteligência Artificial </a:t>
+            </a:r>
+          </a:p>
+          <a:p>
+            <a:endParaRPr lang="pt-BR" dirty="0" smtClean="0"/>
+          </a:p>
+          <a:p>
             <a:r>
               <a:rPr lang="pt-BR" dirty="0" smtClean="0"/>
-              <a:t>Inteligência Artificial </a:t>
-            </a:r>
-            <a:endParaRPr lang="pt-BR" dirty="0" smtClean="0"/>
+              <a:t>Geração automática de sistemas especialistas</a:t>
+            </a:r>
           </a:p>
           <a:p>
             <a:endParaRPr lang="pt-BR" dirty="0" smtClean="0"/>
@@ -6011,49 +6930,16 @@
           <a:p>
             <a:r>
               <a:rPr lang="pt-BR" dirty="0" smtClean="0"/>
-              <a:t>Geração </a:t>
-            </a:r>
+              <a:t>Oferece uma máquina de inferência básica</a:t>
+            </a:r>
+          </a:p>
+          <a:p>
+            <a:endParaRPr lang="pt-BR" dirty="0" smtClean="0"/>
+          </a:p>
+          <a:p>
             <a:r>
               <a:rPr lang="pt-BR" dirty="0" smtClean="0"/>
-              <a:t>automática de sistemas </a:t>
-            </a:r>
-            <a:r>
-              <a:rPr lang="pt-BR" dirty="0" smtClean="0"/>
-              <a:t>especialistas</a:t>
-            </a:r>
-          </a:p>
-          <a:p>
-            <a:endParaRPr lang="pt-BR" dirty="0" smtClean="0"/>
-          </a:p>
-          <a:p>
-            <a:r>
-              <a:rPr lang="pt-BR" dirty="0" smtClean="0"/>
-              <a:t>Oferece </a:t>
-            </a:r>
-            <a:r>
-              <a:rPr lang="pt-BR" dirty="0" smtClean="0"/>
-              <a:t>uma máquina de inferência </a:t>
-            </a:r>
-            <a:r>
-              <a:rPr lang="pt-BR" dirty="0" smtClean="0"/>
-              <a:t>básica</a:t>
-            </a:r>
-          </a:p>
-          <a:p>
-            <a:endParaRPr lang="pt-BR" dirty="0" smtClean="0"/>
-          </a:p>
-          <a:p>
-            <a:r>
-              <a:rPr lang="pt-BR" dirty="0" smtClean="0"/>
-              <a:t>Fundamentada </a:t>
-            </a:r>
-            <a:r>
-              <a:rPr lang="pt-BR" dirty="0" smtClean="0"/>
-              <a:t>no encadeamento para </a:t>
-            </a:r>
-            <a:r>
-              <a:rPr lang="pt-BR" dirty="0" smtClean="0"/>
-              <a:t>trás</a:t>
+              <a:t>Fundamentada no encadeamento para trás</a:t>
             </a:r>
           </a:p>
           <a:p>
@@ -6105,6 +6991,13 @@
   <p:clrMapOvr>
     <a:masterClrMapping/>
   </p:clrMapOvr>
+  <p:timing>
+    <p:tnLst>
+      <p:par>
+        <p:cTn id="1" dur="indefinite" restart="never" nodeType="tmRoot"/>
+      </p:par>
+    </p:tnLst>
+  </p:timing>
 </p:sld>
 </file>
 
@@ -6182,11 +7075,7 @@
             </a:r>
             <a:r>
               <a:rPr lang="pt-BR" sz="1200" dirty="0" smtClean="0"/>
-              <a:t>Laboratório de Inteligência Artificial </a:t>
-            </a:r>
-            <a:r>
-              <a:rPr lang="pt-BR" sz="1200" dirty="0" smtClean="0"/>
-              <a:t>– LIA – Universidade Federal do </a:t>
+              <a:t>Laboratório de Inteligência Artificial – LIA – Universidade Federal do </a:t>
             </a:r>
             <a:r>
               <a:rPr lang="pt-BR" sz="1200" dirty="0" err="1" smtClean="0"/>
@@ -6251,11 +7140,50 @@
           </a:ln>
         </p:spPr>
       </p:pic>
+      <p:pic>
+        <p:nvPicPr>
+          <p:cNvPr id="7" name="Imagem 1" descr="C:\Users\Felipe S. Macedo\Downloads\logo_unb_gama.jpg"/>
+          <p:cNvPicPr>
+            <a:picLocks noChangeAspect="1" noChangeArrowheads="1"/>
+          </p:cNvPicPr>
+          <p:nvPr/>
+        </p:nvPicPr>
+        <p:blipFill>
+          <a:blip r:embed="rId3"/>
+          <a:srcRect/>
+          <a:stretch>
+            <a:fillRect/>
+          </a:stretch>
+        </p:blipFill>
+        <p:spPr bwMode="auto">
+          <a:xfrm>
+            <a:off x="-3071866" y="3571876"/>
+            <a:ext cx="2384425" cy="555625"/>
+          </a:xfrm>
+          <a:prstGeom prst="rect">
+            <a:avLst/>
+          </a:prstGeom>
+          <a:noFill/>
+          <a:ln w="9525">
+            <a:noFill/>
+            <a:miter lim="800000"/>
+            <a:headEnd/>
+            <a:tailEnd/>
+          </a:ln>
+        </p:spPr>
+      </p:pic>
     </p:spTree>
   </p:cSld>
   <p:clrMapOvr>
     <a:masterClrMapping/>
   </p:clrMapOvr>
+  <p:timing>
+    <p:tnLst>
+      <p:par>
+        <p:cTn id="1" dur="indefinite" restart="never" nodeType="tmRoot"/>
+      </p:par>
+    </p:tnLst>
+  </p:timing>
 </p:sld>
 </file>
 
@@ -6288,9 +7216,16 @@
         </p:nvSpPr>
         <p:spPr/>
         <p:txBody>
-          <a:bodyPr/>
-          <a:lstStyle/>
-          <a:p>
+          <a:bodyPr>
+            <a:normAutofit fontScale="90000"/>
+          </a:bodyPr>
+          <a:lstStyle/>
+          <a:p>
+            <a:pPr algn="ctr"/>
+            <a:r>
+              <a:rPr lang="pt-BR" dirty="0" smtClean="0"/>
+              <a:t>Criação de um protótipo de sistema especialista para fratura de colo de  fêmur em idosos  </a:t>
+            </a:r>
             <a:endParaRPr lang="pt-BR" dirty="0"/>
           </a:p>
         </p:txBody>
@@ -6308,83 +7243,52 @@
         <p:spPr/>
         <p:txBody>
           <a:bodyPr>
-            <a:normAutofit fontScale="92500" lnSpcReduction="10000"/>
+            <a:normAutofit/>
           </a:bodyPr>
           <a:lstStyle/>
           <a:p>
-            <a:r>
-              <a:rPr lang="pt-BR" i="1" dirty="0" smtClean="0"/>
-              <a:t>base de conhecimentos representa a informação (fatos e regras) que um</a:t>
-            </a:r>
-          </a:p>
-          <a:p>
-            <a:r>
-              <a:rPr lang="pt-BR" dirty="0" smtClean="0"/>
-              <a:t>especialista utiliza, representada computacionalmente;</a:t>
-            </a:r>
-          </a:p>
-          <a:p>
-            <a:r>
-              <a:rPr lang="pt-BR" dirty="0" smtClean="0"/>
-              <a:t>· </a:t>
-            </a:r>
-            <a:r>
-              <a:rPr lang="pt-BR" i="1" dirty="0" smtClean="0"/>
-              <a:t>editor de bases é o meio pelo qual a </a:t>
-            </a:r>
-            <a:r>
-              <a:rPr lang="pt-BR" i="1" dirty="0" err="1" smtClean="0"/>
-              <a:t>shell</a:t>
-            </a:r>
-            <a:r>
-              <a:rPr lang="pt-BR" i="1" dirty="0" smtClean="0"/>
-              <a:t> permite a implementação das bases</a:t>
-            </a:r>
-          </a:p>
-          <a:p>
-            <a:r>
-              <a:rPr lang="pt-BR" dirty="0" smtClean="0"/>
-              <a:t>desejadas;</a:t>
-            </a:r>
-          </a:p>
-          <a:p>
-            <a:r>
-              <a:rPr lang="pt-BR" dirty="0" smtClean="0"/>
-              <a:t>· </a:t>
-            </a:r>
-            <a:r>
-              <a:rPr lang="pt-BR" i="1" dirty="0" smtClean="0"/>
-              <a:t>máquina de inferência é a parte do SE responsável pelas deduções sobre a</a:t>
-            </a:r>
-          </a:p>
-          <a:p>
-            <a:r>
-              <a:rPr lang="pt-BR" dirty="0" smtClean="0"/>
-              <a:t>base de conhecimentos;</a:t>
-            </a:r>
-          </a:p>
-          <a:p>
-            <a:r>
-              <a:rPr lang="pt-BR" dirty="0" smtClean="0"/>
-              <a:t>· </a:t>
-            </a:r>
-            <a:r>
-              <a:rPr lang="pt-BR" i="1" dirty="0" smtClean="0"/>
-              <a:t>banco de dados global são as evidências apontadas pelo usuário do sistema</a:t>
-            </a:r>
-          </a:p>
-          <a:p>
-            <a:r>
-              <a:rPr lang="pt-BR" dirty="0" smtClean="0"/>
-              <a:t>especialista durante uma consulta.</a:t>
-            </a:r>
-            <a:endParaRPr lang="pt-BR" dirty="0"/>
+            <a:endParaRPr lang="pt-BR" dirty="0" smtClean="0"/>
+          </a:p>
+          <a:p>
+            <a:endParaRPr lang="pt-BR" dirty="0" smtClean="0"/>
+          </a:p>
+          <a:p>
+            <a:endParaRPr lang="pt-BR" dirty="0" smtClean="0"/>
+          </a:p>
+          <a:p>
+            <a:endParaRPr lang="pt-BR" dirty="0" smtClean="0"/>
+          </a:p>
+          <a:p>
+            <a:endParaRPr lang="pt-BR" dirty="0" smtClean="0"/>
+          </a:p>
+          <a:p>
+            <a:endParaRPr lang="pt-BR" dirty="0" smtClean="0"/>
+          </a:p>
+          <a:p>
+            <a:endParaRPr lang="pt-BR" dirty="0" smtClean="0"/>
+          </a:p>
+          <a:p>
+            <a:endParaRPr lang="pt-BR" dirty="0" smtClean="0"/>
+          </a:p>
+          <a:p>
+            <a:endParaRPr lang="pt-BR" dirty="0" smtClean="0"/>
+          </a:p>
+          <a:p>
+            <a:endParaRPr lang="pt-BR" dirty="0" smtClean="0"/>
+          </a:p>
+          <a:p>
+            <a:pPr algn="r"/>
+            <a:r>
+              <a:rPr lang="pt-BR" sz="1200" dirty="0" smtClean="0"/>
+              <a:t>Fonte: Vilela, 2011</a:t>
+            </a:r>
+            <a:endParaRPr lang="pt-BR" sz="1200" dirty="0"/>
           </a:p>
         </p:txBody>
       </p:sp>
       <p:pic>
         <p:nvPicPr>
-          <p:cNvPr id="4" name="Imagem 1" descr="C:\Users\Felipe S. Macedo\Downloads\logo_unb_gama.jpg"/>
+          <p:cNvPr id="30722" name="Picture 2" descr="http://www.ongevalstichting.nl/foto/heupfractuur.jpg"/>
           <p:cNvPicPr>
             <a:picLocks noChangeAspect="1" noChangeArrowheads="1"/>
           </p:cNvPicPr>
@@ -6399,19 +7303,13 @@
         </p:blipFill>
         <p:spPr bwMode="auto">
           <a:xfrm>
-            <a:off x="3500430" y="285728"/>
-            <a:ext cx="2384425" cy="555625"/>
+            <a:off x="2857488" y="2285992"/>
+            <a:ext cx="3810000" cy="2819401"/>
           </a:xfrm>
           <a:prstGeom prst="rect">
             <a:avLst/>
           </a:prstGeom>
           <a:noFill/>
-          <a:ln w="9525">
-            <a:noFill/>
-            <a:miter lim="800000"/>
-            <a:headEnd/>
-            <a:tailEnd/>
-          </a:ln>
         </p:spPr>
       </p:pic>
     </p:spTree>
@@ -6419,6 +7317,13 @@
   <p:clrMapOvr>
     <a:masterClrMapping/>
   </p:clrMapOvr>
+  <p:timing>
+    <p:tnLst>
+      <p:par>
+        <p:cTn id="1" dur="indefinite" restart="never" nodeType="tmRoot"/>
+      </p:par>
+    </p:tnLst>
+  </p:timing>
 </p:sld>
 </file>
 
@@ -6451,79 +7356,79 @@
         </p:nvSpPr>
         <p:spPr/>
         <p:txBody>
+          <a:bodyPr/>
+          <a:lstStyle/>
+          <a:p>
+            <a:pPr algn="ctr"/>
+            <a:r>
+              <a:rPr lang="pt-BR" dirty="0" smtClean="0"/>
+              <a:t>A ARTICULAÇÃO COXOFEMURAL</a:t>
+            </a:r>
+            <a:endParaRPr lang="pt-BR" dirty="0"/>
+          </a:p>
+        </p:txBody>
+      </p:sp>
+      <p:sp>
+        <p:nvSpPr>
+          <p:cNvPr id="3" name="Espaço Reservado para Conteúdo 2"/>
+          <p:cNvSpPr>
+            <a:spLocks noGrp="1"/>
+          </p:cNvSpPr>
+          <p:nvPr>
+            <p:ph sz="quarter" idx="1"/>
+          </p:nvPr>
+        </p:nvSpPr>
+        <p:spPr/>
+        <p:txBody>
           <a:bodyPr>
-            <a:normAutofit fontScale="90000"/>
+            <a:normAutofit fontScale="92500" lnSpcReduction="10000"/>
           </a:bodyPr>
           <a:lstStyle/>
           <a:p>
-            <a:pPr algn="ctr"/>
+            <a:endParaRPr lang="pt-BR" dirty="0" smtClean="0"/>
+          </a:p>
+          <a:p>
+            <a:endParaRPr lang="pt-BR" dirty="0" smtClean="0"/>
+          </a:p>
+          <a:p>
+            <a:endParaRPr lang="pt-BR" dirty="0" smtClean="0"/>
+          </a:p>
+          <a:p>
+            <a:endParaRPr lang="pt-BR" dirty="0" smtClean="0"/>
+          </a:p>
+          <a:p>
+            <a:endParaRPr lang="pt-BR" dirty="0" smtClean="0"/>
+          </a:p>
+          <a:p>
+            <a:endParaRPr lang="pt-BR" dirty="0" smtClean="0"/>
+          </a:p>
+          <a:p>
+            <a:endParaRPr lang="pt-BR" dirty="0" smtClean="0"/>
+          </a:p>
+          <a:p>
+            <a:endParaRPr lang="pt-BR" dirty="0" smtClean="0"/>
+          </a:p>
+          <a:p>
+            <a:endParaRPr lang="pt-BR" dirty="0" smtClean="0"/>
+          </a:p>
+          <a:p>
+            <a:endParaRPr lang="pt-BR" dirty="0" smtClean="0"/>
+          </a:p>
+          <a:p>
+            <a:endParaRPr lang="pt-BR" dirty="0" smtClean="0"/>
+          </a:p>
+          <a:p>
             <a:r>
               <a:rPr lang="pt-BR" dirty="0" smtClean="0"/>
-              <a:t>Criação de um protótipo de sistema especialista para fratura de colo de  fêmur em idosos  </a:t>
+              <a:t>Fonte:</a:t>
             </a:r>
             <a:endParaRPr lang="pt-BR" dirty="0"/>
-          </a:p>
-        </p:txBody>
-      </p:sp>
-      <p:sp>
-        <p:nvSpPr>
-          <p:cNvPr id="3" name="Espaço Reservado para Conteúdo 2"/>
-          <p:cNvSpPr>
-            <a:spLocks noGrp="1"/>
-          </p:cNvSpPr>
-          <p:nvPr>
-            <p:ph sz="quarter" idx="1"/>
-          </p:nvPr>
-        </p:nvSpPr>
-        <p:spPr/>
-        <p:txBody>
-          <a:bodyPr>
-            <a:normAutofit/>
-          </a:bodyPr>
-          <a:lstStyle/>
-          <a:p>
-            <a:endParaRPr lang="pt-BR" dirty="0" smtClean="0"/>
-          </a:p>
-          <a:p>
-            <a:endParaRPr lang="pt-BR" dirty="0" smtClean="0"/>
-          </a:p>
-          <a:p>
-            <a:endParaRPr lang="pt-BR" dirty="0" smtClean="0"/>
-          </a:p>
-          <a:p>
-            <a:endParaRPr lang="pt-BR" dirty="0" smtClean="0"/>
-          </a:p>
-          <a:p>
-            <a:endParaRPr lang="pt-BR" dirty="0" smtClean="0"/>
-          </a:p>
-          <a:p>
-            <a:endParaRPr lang="pt-BR" dirty="0" smtClean="0"/>
-          </a:p>
-          <a:p>
-            <a:endParaRPr lang="pt-BR" dirty="0" smtClean="0"/>
-          </a:p>
-          <a:p>
-            <a:endParaRPr lang="pt-BR" dirty="0" smtClean="0"/>
-          </a:p>
-          <a:p>
-            <a:endParaRPr lang="pt-BR" dirty="0" smtClean="0"/>
-          </a:p>
-          <a:p>
-            <a:endParaRPr lang="pt-BR" dirty="0" smtClean="0"/>
-          </a:p>
-          <a:p>
-            <a:pPr algn="r"/>
-            <a:r>
-              <a:rPr lang="pt-BR" sz="1200" dirty="0" smtClean="0"/>
-              <a:t>Fonte: Vilela, 2011</a:t>
-            </a:r>
-            <a:endParaRPr lang="pt-BR" sz="1200" dirty="0"/>
           </a:p>
         </p:txBody>
       </p:sp>
       <p:pic>
         <p:nvPicPr>
-          <p:cNvPr id="30722" name="Picture 2" descr="http://www.ongevalstichting.nl/foto/heupfractuur.jpg"/>
+          <p:cNvPr id="29700" name="Picture 4" descr="http://www.bursitis101.com/Hip-Bursitis-anatomy-lg.jpg"/>
           <p:cNvPicPr>
             <a:picLocks noChangeAspect="1" noChangeArrowheads="1"/>
           </p:cNvPicPr>
@@ -6538,8 +7443,8 @@
         </p:blipFill>
         <p:spPr bwMode="auto">
           <a:xfrm>
-            <a:off x="2857488" y="2285992"/>
-            <a:ext cx="3810000" cy="2819401"/>
+            <a:off x="0" y="0"/>
+            <a:ext cx="9144000" cy="6858000"/>
           </a:xfrm>
           <a:prstGeom prst="rect">
             <a:avLst/>
@@ -6552,6 +7457,13 @@
   <p:clrMapOvr>
     <a:masterClrMapping/>
   </p:clrMapOvr>
+  <p:timing>
+    <p:tnLst>
+      <p:par>
+        <p:cTn id="1" dur="indefinite" restart="never" nodeType="tmRoot"/>
+      </p:par>
+    </p:tnLst>
+  </p:timing>
 </p:sld>
 </file>
 
@@ -6582,34 +7494,41 @@
             <p:ph type="title"/>
           </p:nvPr>
         </p:nvSpPr>
+        <p:spPr>
+          <a:xfrm>
+            <a:off x="500034" y="285728"/>
+            <a:ext cx="7467600" cy="1143000"/>
+          </a:xfrm>
+        </p:spPr>
+        <p:txBody>
+          <a:bodyPr>
+            <a:normAutofit/>
+          </a:bodyPr>
+          <a:lstStyle/>
+          <a:p>
+            <a:pPr algn="ctr"/>
+            <a:r>
+              <a:rPr lang="pt-BR" dirty="0" smtClean="0"/>
+              <a:t>A FRATURA</a:t>
+            </a:r>
+            <a:endParaRPr lang="pt-BR" dirty="0"/>
+          </a:p>
+        </p:txBody>
+      </p:sp>
+      <p:sp>
+        <p:nvSpPr>
+          <p:cNvPr id="3" name="Espaço Reservado para Conteúdo 2"/>
+          <p:cNvSpPr>
+            <a:spLocks noGrp="1"/>
+          </p:cNvSpPr>
+          <p:nvPr>
+            <p:ph sz="quarter" idx="1"/>
+          </p:nvPr>
+        </p:nvSpPr>
         <p:spPr/>
         <p:txBody>
-          <a:bodyPr/>
-          <a:lstStyle/>
-          <a:p>
-            <a:pPr algn="ctr"/>
-            <a:r>
-              <a:rPr lang="pt-BR" dirty="0" smtClean="0"/>
-              <a:t>A ARTICULAÇÃO COXOFEMURAL</a:t>
-            </a:r>
-            <a:endParaRPr lang="pt-BR" dirty="0"/>
-          </a:p>
-        </p:txBody>
-      </p:sp>
-      <p:sp>
-        <p:nvSpPr>
-          <p:cNvPr id="3" name="Espaço Reservado para Conteúdo 2"/>
-          <p:cNvSpPr>
-            <a:spLocks noGrp="1"/>
-          </p:cNvSpPr>
-          <p:nvPr>
-            <p:ph sz="quarter" idx="1"/>
-          </p:nvPr>
-        </p:nvSpPr>
-        <p:spPr/>
-        <p:txBody>
           <a:bodyPr>
-            <a:normAutofit fontScale="92500" lnSpcReduction="10000"/>
+            <a:normAutofit/>
           </a:bodyPr>
           <a:lstStyle/>
           <a:p>
@@ -6643,20 +7562,18 @@
             <a:endParaRPr lang="pt-BR" dirty="0" smtClean="0"/>
           </a:p>
           <a:p>
-            <a:endParaRPr lang="pt-BR" dirty="0" smtClean="0"/>
-          </a:p>
-          <a:p>
-            <a:r>
-              <a:rPr lang="pt-BR" dirty="0" smtClean="0"/>
-              <a:t>Fonte:</a:t>
-            </a:r>
-            <a:endParaRPr lang="pt-BR" dirty="0"/>
+            <a:pPr algn="r"/>
+            <a:r>
+              <a:rPr lang="pt-BR" sz="1200" dirty="0" smtClean="0"/>
+              <a:t>Fonte: Vilela, 2011</a:t>
+            </a:r>
+            <a:endParaRPr lang="pt-BR" sz="1200" dirty="0"/>
           </a:p>
         </p:txBody>
       </p:sp>
       <p:pic>
         <p:nvPicPr>
-          <p:cNvPr id="29700" name="Picture 4" descr="http://www.bursitis101.com/Hip-Bursitis-anatomy-lg.jpg"/>
+          <p:cNvPr id="30722" name="Picture 2" descr="http://www.ongevalstichting.nl/foto/heupfractuur.jpg"/>
           <p:cNvPicPr>
             <a:picLocks noChangeAspect="1" noChangeArrowheads="1"/>
           </p:cNvPicPr>
@@ -6671,8 +7588,8 @@
         </p:blipFill>
         <p:spPr bwMode="auto">
           <a:xfrm>
-            <a:off x="0" y="0"/>
-            <a:ext cx="9144000" cy="6858000"/>
+            <a:off x="2857488" y="2285992"/>
+            <a:ext cx="3810000" cy="2819401"/>
           </a:xfrm>
           <a:prstGeom prst="rect">
             <a:avLst/>
@@ -6685,6 +7602,13 @@
   <p:clrMapOvr>
     <a:masterClrMapping/>
   </p:clrMapOvr>
+  <p:timing>
+    <p:tnLst>
+      <p:par>
+        <p:cTn id="1" dur="indefinite" restart="never" nodeType="tmRoot"/>
+      </p:par>
+    </p:tnLst>
+  </p:timing>
 </p:sld>
 </file>
 
@@ -6792,15 +7716,25 @@
           <a:p>
             <a:r>
               <a:rPr lang="pt-BR" dirty="0" smtClean="0"/>
-              <a:t>90</a:t>
-            </a:r>
+              <a:t>90% - quedas</a:t>
+            </a:r>
+          </a:p>
+          <a:p>
+            <a:endParaRPr lang="pt-BR" dirty="0" smtClean="0"/>
+          </a:p>
+          <a:p>
             <a:r>
               <a:rPr lang="pt-BR" dirty="0" smtClean="0"/>
-              <a:t>% </a:t>
-            </a:r>
+              <a:t>Fratura em casa, entre o quarto e o banheiro durante a noite </a:t>
+            </a:r>
+          </a:p>
+          <a:p>
+            <a:endParaRPr lang="pt-BR" dirty="0" smtClean="0"/>
+          </a:p>
+          <a:p>
             <a:r>
               <a:rPr lang="pt-BR" dirty="0" smtClean="0"/>
-              <a:t>- quedas</a:t>
+              <a:t>DATASUS - impacto econômico </a:t>
             </a:r>
           </a:p>
           <a:p>
@@ -6809,44 +7743,8 @@
           <a:p>
             <a:r>
               <a:rPr lang="pt-BR" dirty="0" smtClean="0"/>
-              <a:t>Fratura em casa, entre o quarto e o banheiro durante a </a:t>
-            </a:r>
-            <a:r>
-              <a:rPr lang="pt-BR" dirty="0" smtClean="0"/>
-              <a:t>noite</a:t>
-            </a:r>
-            <a:r>
-              <a:rPr lang="pt-BR" dirty="0" smtClean="0"/>
-              <a:t> </a:t>
-            </a:r>
-          </a:p>
-          <a:p>
-            <a:endParaRPr lang="pt-BR" dirty="0" smtClean="0"/>
-          </a:p>
-          <a:p>
-            <a:r>
-              <a:rPr lang="pt-BR" dirty="0" smtClean="0"/>
-              <a:t>DATASUS - impacto </a:t>
-            </a:r>
-            <a:r>
-              <a:rPr lang="pt-BR" dirty="0" smtClean="0"/>
-              <a:t>econômico </a:t>
-            </a:r>
-            <a:endParaRPr lang="pt-BR" dirty="0" smtClean="0"/>
-          </a:p>
-          <a:p>
-            <a:endParaRPr lang="pt-BR" dirty="0" smtClean="0"/>
-          </a:p>
-          <a:p>
-            <a:r>
-              <a:rPr lang="pt-BR" dirty="0" smtClean="0"/>
-              <a:t>SBOT  - 25</a:t>
-            </a:r>
-            <a:r>
-              <a:rPr lang="pt-BR" dirty="0" smtClean="0"/>
-              <a:t>% dos idosos que sofrem fratura do fêmur  morrem em menos de um ano após a fratura. </a:t>
-            </a:r>
-            <a:endParaRPr lang="pt-BR" dirty="0" smtClean="0"/>
+              <a:t>SBOT  - 25% dos idosos que sofrem fratura do fêmur  morrem em menos de um ano após a fratura. </a:t>
+            </a:r>
           </a:p>
           <a:p>
             <a:endParaRPr lang="pt-BR" dirty="0" smtClean="0"/>
@@ -6890,6 +7788,13 @@
   <p:clrMapOvr>
     <a:masterClrMapping/>
   </p:clrMapOvr>
+  <p:timing>
+    <p:tnLst>
+      <p:par>
+        <p:cTn id="1" dur="indefinite" restart="never" nodeType="tmRoot"/>
+      </p:par>
+    </p:tnLst>
+  </p:timing>
 </p:sld>
 </file>
 
@@ -6979,6 +7884,13 @@
   <p:clrMapOvr>
     <a:masterClrMapping/>
   </p:clrMapOvr>
+  <p:timing>
+    <p:tnLst>
+      <p:par>
+        <p:cTn id="1" dur="indefinite" restart="never" nodeType="tmRoot"/>
+      </p:par>
+    </p:tnLst>
+  </p:timing>
 </p:sld>
 </file>
 
@@ -7068,6 +7980,13 @@
   <p:clrMapOvr>
     <a:masterClrMapping/>
   </p:clrMapOvr>
+  <p:timing>
+    <p:tnLst>
+      <p:par>
+        <p:cTn id="1" dur="indefinite" restart="never" nodeType="tmRoot"/>
+      </p:par>
+    </p:tnLst>
+  </p:timing>
 </p:sld>
 </file>
 

</xml_diff>